<commit_message>
Finally adding all the files to date on to Git Hub.  This includes are site files.
</commit_message>
<xml_diff>
--- a/Presentation.pptx
+++ b/Presentation.pptx
@@ -5,7 +5,7 @@
     <p:sldMasterId id="2147483660" r:id="rId1"/>
   </p:sldMasterIdLst>
   <p:notesMasterIdLst>
-    <p:notesMasterId r:id="rId8"/>
+    <p:notesMasterId r:id="rId12"/>
   </p:notesMasterIdLst>
   <p:sldIdLst>
     <p:sldId id="256" r:id="rId2"/>
@@ -14,6 +14,10 @@
     <p:sldId id="259" r:id="rId5"/>
     <p:sldId id="260" r:id="rId6"/>
     <p:sldId id="261" r:id="rId7"/>
+    <p:sldId id="262" r:id="rId8"/>
+    <p:sldId id="263" r:id="rId9"/>
+    <p:sldId id="264" r:id="rId10"/>
+    <p:sldId id="265" r:id="rId11"/>
   </p:sldIdLst>
   <p:sldSz cx="9144000" cy="6858000" type="screen4x3"/>
   <p:notesSz cx="6858000" cy="9144000"/>
@@ -114,7 +118,7 @@
   </p:defaultTextStyle>
   <p:extLst>
     <p:ext uri="{EFAFB233-063F-42B5-8137-9DF3F51BA10A}">
-      <p15:sldGuideLst xmlns:p15="http://schemas.microsoft.com/office/powerpoint/2012/main" xmlns="">
+      <p15:sldGuideLst xmlns:p15="http://schemas.microsoft.com/office/powerpoint/2012/main">
         <p15:guide id="1" orient="horz" pos="2160">
           <p15:clr>
             <a:srgbClr val="A4A3A4"/>
@@ -213,7 +217,7 @@
           <a:p>
             <a:fld id="{524FA0F7-D629-4EAB-9551-5D00924E9B65}" type="datetimeFigureOut">
               <a:rPr lang="en-US" smtClean="0"/>
-              <a:t>2/10/2015</a:t>
+              <a:t>3/9/2015</a:t>
             </a:fld>
             <a:endParaRPr lang="en-US"/>
           </a:p>
@@ -678,6 +682,119 @@
 </p:notes>
 </file>
 
+<file path=ppt/notesSlides/notesSlide3.xml><?xml version="1.0" encoding="utf-8"?>
+<p:notes xmlns:a="http://schemas.openxmlformats.org/drawingml/2006/main" xmlns:r="http://schemas.openxmlformats.org/officeDocument/2006/relationships" xmlns:p="http://schemas.openxmlformats.org/presentationml/2006/main">
+  <p:cSld>
+    <p:spTree>
+      <p:nvGrpSpPr>
+        <p:cNvPr id="1" name=""/>
+        <p:cNvGrpSpPr/>
+        <p:nvPr/>
+      </p:nvGrpSpPr>
+      <p:grpSpPr>
+        <a:xfrm>
+          <a:off x="0" y="0"/>
+          <a:ext cx="0" cy="0"/>
+          <a:chOff x="0" y="0"/>
+          <a:chExt cx="0" cy="0"/>
+        </a:xfrm>
+      </p:grpSpPr>
+      <p:sp>
+        <p:nvSpPr>
+          <p:cNvPr id="2" name="Slide Image Placeholder 1"/>
+          <p:cNvSpPr>
+            <a:spLocks noGrp="1" noRot="1" noChangeAspect="1"/>
+          </p:cNvSpPr>
+          <p:nvPr>
+            <p:ph type="sldImg"/>
+          </p:nvPr>
+        </p:nvSpPr>
+        <p:spPr/>
+      </p:sp>
+      <p:sp>
+        <p:nvSpPr>
+          <p:cNvPr id="3" name="Notes Placeholder 2"/>
+          <p:cNvSpPr>
+            <a:spLocks noGrp="1"/>
+          </p:cNvSpPr>
+          <p:nvPr>
+            <p:ph type="body" idx="1"/>
+          </p:nvPr>
+        </p:nvSpPr>
+        <p:spPr/>
+        <p:txBody>
+          <a:bodyPr/>
+          <a:lstStyle/>
+          <a:p>
+            <a:r>
+              <a:rPr lang="en-US" sz="1200" dirty="0" smtClean="0"/>
+              <a:t>Dr. Sears decided he would like to be able to use our app to upload pictures to his website, rather than email them to himself to upload them. </a:t>
+            </a:r>
+          </a:p>
+          <a:p>
+            <a:endParaRPr lang="en-US" sz="1200" dirty="0" smtClean="0"/>
+          </a:p>
+          <a:p>
+            <a:r>
+              <a:rPr lang="en-US" sz="1200" dirty="0" smtClean="0"/>
+              <a:t>Talked about adding a purchase feature, where customers can go online and purchase products from his store. </a:t>
+            </a:r>
+          </a:p>
+          <a:p>
+            <a:endParaRPr lang="en-US" sz="1200" dirty="0" smtClean="0"/>
+          </a:p>
+          <a:p>
+            <a:r>
+              <a:rPr lang="en-US" sz="1200" dirty="0" smtClean="0"/>
+              <a:t>Ability to print QR codes with title and description of item. Not sure what we will use</a:t>
+            </a:r>
+            <a:r>
+              <a:rPr lang="en-US" sz="1200" baseline="0" dirty="0" smtClean="0"/>
+              <a:t> to do the printing, and if different sizes will be an option, we will talk about that with him next meeting. </a:t>
+            </a:r>
+            <a:endParaRPr lang="en-US" sz="1200" dirty="0" smtClean="0"/>
+          </a:p>
+          <a:p>
+            <a:endParaRPr lang="en-US" dirty="0"/>
+          </a:p>
+        </p:txBody>
+      </p:sp>
+      <p:sp>
+        <p:nvSpPr>
+          <p:cNvPr id="4" name="Slide Number Placeholder 3"/>
+          <p:cNvSpPr>
+            <a:spLocks noGrp="1"/>
+          </p:cNvSpPr>
+          <p:nvPr>
+            <p:ph type="sldNum" sz="quarter" idx="10"/>
+          </p:nvPr>
+        </p:nvSpPr>
+        <p:spPr/>
+        <p:txBody>
+          <a:bodyPr/>
+          <a:lstStyle/>
+          <a:p>
+            <a:fld id="{84628005-1ECA-4AF7-8656-39EAE31322E5}" type="slidenum">
+              <a:rPr lang="en-US" smtClean="0"/>
+              <a:t>9</a:t>
+            </a:fld>
+            <a:endParaRPr lang="en-US"/>
+          </a:p>
+        </p:txBody>
+      </p:sp>
+    </p:spTree>
+    <p:extLst>
+      <p:ext uri="{BB962C8B-B14F-4D97-AF65-F5344CB8AC3E}">
+        <p14:creationId xmlns:p14="http://schemas.microsoft.com/office/powerpoint/2010/main" val="3591798390"/>
+      </p:ext>
+    </p:extLst>
+  </p:cSld>
+  <p:clrMapOvr>
+    <a:masterClrMapping/>
+  </p:clrMapOvr>
+</p:notes>
+</file>
+
 <file path=ppt/slideLayouts/slideLayout1.xml><?xml version="1.0" encoding="utf-8"?>
 <p:sldLayout xmlns:a="http://schemas.openxmlformats.org/drawingml/2006/main" xmlns:r="http://schemas.openxmlformats.org/officeDocument/2006/relationships" xmlns:p="http://schemas.openxmlformats.org/presentationml/2006/main" type="title" preserve="1">
   <p:cSld name="Title Slide">
@@ -1013,7 +1130,7 @@
           <a:p>
             <a:fld id="{DE462E9B-779B-4769-8ABB-34F3397A96F0}" type="datetimeFigureOut">
               <a:rPr lang="en-US" smtClean="0"/>
-              <a:t>2/10/2015</a:t>
+              <a:t>3/9/2015</a:t>
             </a:fld>
             <a:endParaRPr lang="en-US"/>
           </a:p>
@@ -1212,7 +1329,7 @@
           <a:p>
             <a:fld id="{DE462E9B-779B-4769-8ABB-34F3397A96F0}" type="datetimeFigureOut">
               <a:rPr lang="en-US" smtClean="0"/>
-              <a:t>2/10/2015</a:t>
+              <a:t>3/9/2015</a:t>
             </a:fld>
             <a:endParaRPr lang="en-US"/>
           </a:p>
@@ -1408,7 +1525,7 @@
           <a:p>
             <a:fld id="{DE462E9B-779B-4769-8ABB-34F3397A96F0}" type="datetimeFigureOut">
               <a:rPr lang="en-US" smtClean="0"/>
-              <a:t>2/10/2015</a:t>
+              <a:t>3/9/2015</a:t>
             </a:fld>
             <a:endParaRPr lang="en-US"/>
           </a:p>
@@ -1695,7 +1812,7 @@
           <a:p>
             <a:fld id="{DE462E9B-779B-4769-8ABB-34F3397A96F0}" type="datetimeFigureOut">
               <a:rPr lang="en-US" smtClean="0"/>
-              <a:t>2/10/2015</a:t>
+              <a:t>3/9/2015</a:t>
             </a:fld>
             <a:endParaRPr lang="en-US"/>
           </a:p>
@@ -2006,7 +2123,7 @@
           <a:p>
             <a:fld id="{DE462E9B-779B-4769-8ABB-34F3397A96F0}" type="datetimeFigureOut">
               <a:rPr lang="en-US" smtClean="0"/>
-              <a:t>2/10/2015</a:t>
+              <a:t>3/9/2015</a:t>
             </a:fld>
             <a:endParaRPr lang="en-US"/>
           </a:p>
@@ -2469,7 +2586,7 @@
           <a:p>
             <a:fld id="{DE462E9B-779B-4769-8ABB-34F3397A96F0}" type="datetimeFigureOut">
               <a:rPr lang="en-US" smtClean="0"/>
-              <a:t>2/10/2015</a:t>
+              <a:t>3/9/2015</a:t>
             </a:fld>
             <a:endParaRPr lang="en-US"/>
           </a:p>
@@ -2606,7 +2723,7 @@
           <a:p>
             <a:fld id="{DE462E9B-779B-4769-8ABB-34F3397A96F0}" type="datetimeFigureOut">
               <a:rPr lang="en-US" smtClean="0"/>
-              <a:t>2/10/2015</a:t>
+              <a:t>3/9/2015</a:t>
             </a:fld>
             <a:endParaRPr lang="en-US"/>
           </a:p>
@@ -2728,7 +2845,7 @@
           <a:p>
             <a:fld id="{DE462E9B-779B-4769-8ABB-34F3397A96F0}" type="datetimeFigureOut">
               <a:rPr lang="en-US" smtClean="0"/>
-              <a:t>2/10/2015</a:t>
+              <a:t>3/9/2015</a:t>
             </a:fld>
             <a:endParaRPr lang="en-US"/>
           </a:p>
@@ -3057,7 +3174,7 @@
           <a:p>
             <a:fld id="{DE462E9B-779B-4769-8ABB-34F3397A96F0}" type="datetimeFigureOut">
               <a:rPr lang="en-US" smtClean="0"/>
-              <a:t>2/10/2015</a:t>
+              <a:t>3/9/2015</a:t>
             </a:fld>
             <a:endParaRPr lang="en-US"/>
           </a:p>
@@ -3375,7 +3492,7 @@
           <a:p>
             <a:fld id="{DE462E9B-779B-4769-8ABB-34F3397A96F0}" type="datetimeFigureOut">
               <a:rPr lang="en-US" smtClean="0"/>
-              <a:t>2/10/2015</a:t>
+              <a:t>3/9/2015</a:t>
             </a:fld>
             <a:endParaRPr lang="en-US"/>
           </a:p>
@@ -3616,7 +3733,7 @@
           <a:p>
             <a:fld id="{DE462E9B-779B-4769-8ABB-34F3397A96F0}" type="datetimeFigureOut">
               <a:rPr lang="en-US" smtClean="0"/>
-              <a:t>2/10/2015</a:t>
+              <a:t>3/9/2015</a:t>
             </a:fld>
             <a:endParaRPr lang="en-US"/>
           </a:p>
@@ -4042,7 +4159,7 @@
   </p:txStyles>
   <p:extLst mod="1">
     <p:ext uri="{27BBF7A9-308A-43DC-89C8-2F10F3537804}">
-      <p15:sldGuideLst xmlns:p15="http://schemas.microsoft.com/office/powerpoint/2012/main" xmlns="">
+      <p15:sldGuideLst xmlns:p15="http://schemas.microsoft.com/office/powerpoint/2012/main">
         <p15:guide id="1" pos="3839">
           <p15:clr>
             <a:srgbClr val="F26B43"/>
@@ -4152,6 +4269,155 @@
       </p:transition>
     </mc:Fallback>
   </mc:AlternateContent>
+  <p:timing>
+    <p:tnLst>
+      <p:par>
+        <p:cTn id="1" dur="indefinite" restart="never" nodeType="tmRoot"/>
+      </p:par>
+    </p:tnLst>
+  </p:timing>
+</p:sld>
+</file>
+
+<file path=ppt/slides/slide10.xml><?xml version="1.0" encoding="utf-8"?>
+<p:sld xmlns:a="http://schemas.openxmlformats.org/drawingml/2006/main" xmlns:r="http://schemas.openxmlformats.org/officeDocument/2006/relationships" xmlns:p="http://schemas.openxmlformats.org/presentationml/2006/main">
+  <p:cSld>
+    <p:spTree>
+      <p:nvGrpSpPr>
+        <p:cNvPr id="1" name=""/>
+        <p:cNvGrpSpPr/>
+        <p:nvPr/>
+      </p:nvGrpSpPr>
+      <p:grpSpPr>
+        <a:xfrm>
+          <a:off x="0" y="0"/>
+          <a:ext cx="0" cy="0"/>
+          <a:chOff x="0" y="0"/>
+          <a:chExt cx="0" cy="0"/>
+        </a:xfrm>
+      </p:grpSpPr>
+      <p:sp>
+        <p:nvSpPr>
+          <p:cNvPr id="2" name="Title 1"/>
+          <p:cNvSpPr>
+            <a:spLocks noGrp="1"/>
+          </p:cNvSpPr>
+          <p:nvPr>
+            <p:ph type="title"/>
+          </p:nvPr>
+        </p:nvSpPr>
+        <p:spPr/>
+        <p:txBody>
+          <a:bodyPr/>
+          <a:lstStyle/>
+          <a:p>
+            <a:r>
+              <a:rPr lang="en-US" dirty="0" smtClean="0"/>
+              <a:t>Project updates</a:t>
+            </a:r>
+            <a:endParaRPr lang="en-US" dirty="0"/>
+          </a:p>
+        </p:txBody>
+      </p:sp>
+      <p:sp>
+        <p:nvSpPr>
+          <p:cNvPr id="3" name="Content Placeholder 2"/>
+          <p:cNvSpPr>
+            <a:spLocks noGrp="1"/>
+          </p:cNvSpPr>
+          <p:nvPr>
+            <p:ph idx="1"/>
+          </p:nvPr>
+        </p:nvSpPr>
+        <p:spPr/>
+        <p:txBody>
+          <a:bodyPr/>
+          <a:lstStyle/>
+          <a:p>
+            <a:r>
+              <a:rPr lang="en-US" dirty="0" smtClean="0"/>
+              <a:t>Completed tasks</a:t>
+            </a:r>
+          </a:p>
+          <a:p>
+            <a:r>
+              <a:rPr lang="en-US" dirty="0" err="1" smtClean="0"/>
+              <a:t>Burndown</a:t>
+            </a:r>
+            <a:r>
+              <a:rPr lang="en-US" dirty="0" smtClean="0"/>
+              <a:t> chart</a:t>
+            </a:r>
+          </a:p>
+          <a:p>
+            <a:r>
+              <a:rPr lang="en-US" dirty="0" smtClean="0"/>
+              <a:t>Hard coded Admin Login page, set up user database via </a:t>
+            </a:r>
+            <a:r>
+              <a:rPr lang="en-US" dirty="0" err="1" smtClean="0"/>
+              <a:t>phpmyadmin</a:t>
+            </a:r>
+            <a:r>
+              <a:rPr lang="en-US" dirty="0" smtClean="0"/>
+              <a:t>.  Took 6 hours</a:t>
+            </a:r>
+            <a:r>
+              <a:rPr lang="en-US" dirty="0" smtClean="0"/>
+              <a:t>. (instead of 3 according to </a:t>
+            </a:r>
+            <a:r>
+              <a:rPr lang="en-US" smtClean="0"/>
+              <a:t>our tasks)</a:t>
+            </a:r>
+            <a:endParaRPr lang="en-US" dirty="0" smtClean="0"/>
+          </a:p>
+          <a:p>
+            <a:r>
+              <a:rPr lang="en-US" dirty="0" smtClean="0"/>
+              <a:t>Next Steps:  All group members install </a:t>
+            </a:r>
+            <a:r>
+              <a:rPr lang="en-US" dirty="0" err="1" smtClean="0"/>
+              <a:t>xAmpp</a:t>
+            </a:r>
+            <a:r>
+              <a:rPr lang="en-US" dirty="0" smtClean="0"/>
+              <a:t>. </a:t>
+            </a:r>
+            <a:endParaRPr lang="en-US" dirty="0"/>
+          </a:p>
+        </p:txBody>
+      </p:sp>
+    </p:spTree>
+    <p:extLst>
+      <p:ext uri="{BB962C8B-B14F-4D97-AF65-F5344CB8AC3E}">
+        <p14:creationId xmlns:p14="http://schemas.microsoft.com/office/powerpoint/2010/main" val="94149992"/>
+      </p:ext>
+    </p:extLst>
+  </p:cSld>
+  <p:clrMapOvr>
+    <a:masterClrMapping/>
+  </p:clrMapOvr>
+  <mc:AlternateContent xmlns:mc="http://schemas.openxmlformats.org/markup-compatibility/2006" xmlns:p14="http://schemas.microsoft.com/office/powerpoint/2010/main">
+    <mc:Choice Requires="p14">
+      <p:transition spd="med" p14:dur="700">
+        <p:fade/>
+      </p:transition>
+    </mc:Choice>
+    <mc:Fallback xmlns="">
+      <p:transition spd="med">
+        <p:fade/>
+      </p:transition>
+    </mc:Fallback>
+  </mc:AlternateContent>
+  <p:timing>
+    <p:tnLst>
+      <p:par>
+        <p:cTn id="1" dur="indefinite" restart="never" nodeType="tmRoot"/>
+      </p:par>
+    </p:tnLst>
+  </p:timing>
 </p:sld>
 </file>
 
@@ -4405,6 +4671,13 @@
       </p:transition>
     </mc:Fallback>
   </mc:AlternateContent>
+  <p:timing>
+    <p:tnLst>
+      <p:par>
+        <p:cTn id="1" dur="indefinite" restart="never" nodeType="tmRoot"/>
+      </p:par>
+    </p:tnLst>
+  </p:timing>
 </p:sld>
 </file>
 
@@ -4533,6 +4806,13 @@
       </p:transition>
     </mc:Fallback>
   </mc:AlternateContent>
+  <p:timing>
+    <p:tnLst>
+      <p:par>
+        <p:cTn id="1" dur="indefinite" restart="never" nodeType="tmRoot"/>
+      </p:par>
+    </p:tnLst>
+  </p:timing>
 </p:sld>
 </file>
 
@@ -4625,13 +4905,8 @@
             </a:pPr>
             <a:r>
               <a:rPr lang="en-US" sz="2800" dirty="0" smtClean="0"/>
-              <a:t>Also print off a QR code for each new </a:t>
-            </a:r>
-            <a:r>
-              <a:rPr lang="en-US" sz="2800" dirty="0" smtClean="0"/>
-              <a:t>item</a:t>
-            </a:r>
-            <a:endParaRPr lang="en-US" sz="2800" dirty="0" smtClean="0"/>
+              <a:t>Also print off a QR code for each new item</a:t>
+            </a:r>
           </a:p>
         </p:txBody>
       </p:sp>
@@ -4657,6 +4932,13 @@
       </p:transition>
     </mc:Fallback>
   </mc:AlternateContent>
+  <p:timing>
+    <p:tnLst>
+      <p:par>
+        <p:cTn id="1" dur="indefinite" restart="never" nodeType="tmRoot"/>
+      </p:par>
+    </p:tnLst>
+  </p:timing>
 </p:sld>
 </file>
 
@@ -4755,6 +5037,320 @@
       </p:transition>
     </mc:Fallback>
   </mc:AlternateContent>
+</p:sld>
+</file>
+
+<file path=ppt/slides/slide7.xml><?xml version="1.0" encoding="utf-8"?>
+<p:sld xmlns:a="http://schemas.openxmlformats.org/drawingml/2006/main" xmlns:r="http://schemas.openxmlformats.org/officeDocument/2006/relationships" xmlns:p="http://schemas.openxmlformats.org/presentationml/2006/main">
+  <p:cSld>
+    <p:spTree>
+      <p:nvGrpSpPr>
+        <p:cNvPr id="1" name=""/>
+        <p:cNvGrpSpPr/>
+        <p:nvPr/>
+      </p:nvGrpSpPr>
+      <p:grpSpPr>
+        <a:xfrm>
+          <a:off x="0" y="0"/>
+          <a:ext cx="0" cy="0"/>
+          <a:chOff x="0" y="0"/>
+          <a:chExt cx="0" cy="0"/>
+        </a:xfrm>
+      </p:grpSpPr>
+      <p:sp>
+        <p:nvSpPr>
+          <p:cNvPr id="4" name="Title 3"/>
+          <p:cNvSpPr>
+            <a:spLocks noGrp="1"/>
+          </p:cNvSpPr>
+          <p:nvPr>
+            <p:ph type="ctrTitle"/>
+          </p:nvPr>
+        </p:nvSpPr>
+        <p:spPr/>
+        <p:txBody>
+          <a:bodyPr>
+            <a:normAutofit/>
+          </a:bodyPr>
+          <a:lstStyle/>
+          <a:p>
+            <a:r>
+              <a:rPr lang="en-US" sz="8000" dirty="0" smtClean="0"/>
+              <a:t>UPDATE II</a:t>
+            </a:r>
+            <a:endParaRPr lang="en-US" sz="8000" dirty="0"/>
+          </a:p>
+        </p:txBody>
+      </p:sp>
+      <p:sp>
+        <p:nvSpPr>
+          <p:cNvPr id="5" name="Subtitle 4"/>
+          <p:cNvSpPr>
+            <a:spLocks noGrp="1"/>
+          </p:cNvSpPr>
+          <p:nvPr>
+            <p:ph type="subTitle" idx="1"/>
+          </p:nvPr>
+        </p:nvSpPr>
+        <p:spPr/>
+        <p:txBody>
+          <a:bodyPr>
+            <a:normAutofit/>
+          </a:bodyPr>
+          <a:lstStyle/>
+          <a:p>
+            <a:r>
+              <a:rPr lang="en-US" sz="4000" dirty="0" smtClean="0"/>
+              <a:t>THE BROGRAMMERS</a:t>
+            </a:r>
+            <a:endParaRPr lang="en-US" sz="4000" dirty="0"/>
+          </a:p>
+        </p:txBody>
+      </p:sp>
+    </p:spTree>
+    <p:extLst>
+      <p:ext uri="{BB962C8B-B14F-4D97-AF65-F5344CB8AC3E}">
+        <p14:creationId xmlns:p14="http://schemas.microsoft.com/office/powerpoint/2010/main" val="1959759818"/>
+      </p:ext>
+    </p:extLst>
+  </p:cSld>
+  <p:clrMapOvr>
+    <a:masterClrMapping/>
+  </p:clrMapOvr>
+  <mc:AlternateContent xmlns:mc="http://schemas.openxmlformats.org/markup-compatibility/2006" xmlns:p14="http://schemas.microsoft.com/office/powerpoint/2010/main">
+    <mc:Choice Requires="p14">
+      <p:transition spd="med" p14:dur="700">
+        <p:fade/>
+      </p:transition>
+    </mc:Choice>
+    <mc:Fallback xmlns="">
+      <p:transition spd="med">
+        <p:fade/>
+      </p:transition>
+    </mc:Fallback>
+  </mc:AlternateContent>
+  <p:timing>
+    <p:tnLst>
+      <p:par>
+        <p:cTn id="1" dur="indefinite" restart="never" nodeType="tmRoot"/>
+      </p:par>
+    </p:tnLst>
+  </p:timing>
+</p:sld>
+</file>
+
+<file path=ppt/slides/slide8.xml><?xml version="1.0" encoding="utf-8"?>
+<p:sld xmlns:a="http://schemas.openxmlformats.org/drawingml/2006/main" xmlns:r="http://schemas.openxmlformats.org/officeDocument/2006/relationships" xmlns:p="http://schemas.openxmlformats.org/presentationml/2006/main">
+  <p:cSld>
+    <p:spTree>
+      <p:nvGrpSpPr>
+        <p:cNvPr id="1" name=""/>
+        <p:cNvGrpSpPr/>
+        <p:nvPr/>
+      </p:nvGrpSpPr>
+      <p:grpSpPr>
+        <a:xfrm>
+          <a:off x="0" y="0"/>
+          <a:ext cx="0" cy="0"/>
+          <a:chOff x="0" y="0"/>
+          <a:chExt cx="0" cy="0"/>
+        </a:xfrm>
+      </p:grpSpPr>
+      <p:sp>
+        <p:nvSpPr>
+          <p:cNvPr id="2" name="Title 1"/>
+          <p:cNvSpPr>
+            <a:spLocks noGrp="1"/>
+          </p:cNvSpPr>
+          <p:nvPr>
+            <p:ph type="title"/>
+          </p:nvPr>
+        </p:nvSpPr>
+        <p:spPr/>
+        <p:txBody>
+          <a:bodyPr>
+            <a:normAutofit/>
+          </a:bodyPr>
+          <a:lstStyle/>
+          <a:p>
+            <a:r>
+              <a:rPr lang="en-US" sz="4000" dirty="0" smtClean="0"/>
+              <a:t>Design Methods</a:t>
+            </a:r>
+            <a:endParaRPr lang="en-US" sz="4000" dirty="0"/>
+          </a:p>
+        </p:txBody>
+      </p:sp>
+      <p:sp>
+        <p:nvSpPr>
+          <p:cNvPr id="3" name="Content Placeholder 2"/>
+          <p:cNvSpPr>
+            <a:spLocks noGrp="1"/>
+          </p:cNvSpPr>
+          <p:nvPr>
+            <p:ph idx="1"/>
+          </p:nvPr>
+        </p:nvSpPr>
+        <p:spPr/>
+        <p:txBody>
+          <a:bodyPr>
+            <a:normAutofit/>
+          </a:bodyPr>
+          <a:lstStyle/>
+          <a:p>
+            <a:r>
+              <a:rPr lang="en-US" sz="2800" dirty="0" smtClean="0"/>
+              <a:t>We will be using Bootstrap to develop our webpage, this will allow us to format our webpage to be compatible with mobile devices. </a:t>
+            </a:r>
+          </a:p>
+          <a:p>
+            <a:r>
+              <a:rPr lang="en-US" sz="2800" dirty="0" smtClean="0"/>
+              <a:t>We will be coding in HTML and PHP.</a:t>
+            </a:r>
+          </a:p>
+        </p:txBody>
+      </p:sp>
+    </p:spTree>
+    <p:extLst>
+      <p:ext uri="{BB962C8B-B14F-4D97-AF65-F5344CB8AC3E}">
+        <p14:creationId xmlns:p14="http://schemas.microsoft.com/office/powerpoint/2010/main" val="716258312"/>
+      </p:ext>
+    </p:extLst>
+  </p:cSld>
+  <p:clrMapOvr>
+    <a:masterClrMapping/>
+  </p:clrMapOvr>
+  <mc:AlternateContent xmlns:mc="http://schemas.openxmlformats.org/markup-compatibility/2006" xmlns:p14="http://schemas.microsoft.com/office/powerpoint/2010/main">
+    <mc:Choice Requires="p14">
+      <p:transition spd="med" p14:dur="700">
+        <p:fade/>
+      </p:transition>
+    </mc:Choice>
+    <mc:Fallback xmlns="">
+      <p:transition spd="med">
+        <p:fade/>
+      </p:transition>
+    </mc:Fallback>
+  </mc:AlternateContent>
+  <p:timing>
+    <p:tnLst>
+      <p:par>
+        <p:cTn id="1" dur="indefinite" restart="never" nodeType="tmRoot"/>
+      </p:par>
+    </p:tnLst>
+  </p:timing>
+</p:sld>
+</file>
+
+<file path=ppt/slides/slide9.xml><?xml version="1.0" encoding="utf-8"?>
+<p:sld xmlns:a="http://schemas.openxmlformats.org/drawingml/2006/main" xmlns:r="http://schemas.openxmlformats.org/officeDocument/2006/relationships" xmlns:p="http://schemas.openxmlformats.org/presentationml/2006/main">
+  <p:cSld>
+    <p:spTree>
+      <p:nvGrpSpPr>
+        <p:cNvPr id="1" name=""/>
+        <p:cNvGrpSpPr/>
+        <p:nvPr/>
+      </p:nvGrpSpPr>
+      <p:grpSpPr>
+        <a:xfrm>
+          <a:off x="0" y="0"/>
+          <a:ext cx="0" cy="0"/>
+          <a:chOff x="0" y="0"/>
+          <a:chExt cx="0" cy="0"/>
+        </a:xfrm>
+      </p:grpSpPr>
+      <p:sp>
+        <p:nvSpPr>
+          <p:cNvPr id="2" name="Title 1"/>
+          <p:cNvSpPr>
+            <a:spLocks noGrp="1"/>
+          </p:cNvSpPr>
+          <p:nvPr>
+            <p:ph type="title"/>
+          </p:nvPr>
+        </p:nvSpPr>
+        <p:spPr/>
+        <p:txBody>
+          <a:bodyPr>
+            <a:normAutofit/>
+          </a:bodyPr>
+          <a:lstStyle/>
+          <a:p>
+            <a:r>
+              <a:rPr lang="en-US" sz="4400" dirty="0" smtClean="0"/>
+              <a:t>Project Updates</a:t>
+            </a:r>
+            <a:endParaRPr lang="en-US" sz="4400" dirty="0"/>
+          </a:p>
+        </p:txBody>
+      </p:sp>
+      <p:sp>
+        <p:nvSpPr>
+          <p:cNvPr id="3" name="Content Placeholder 2"/>
+          <p:cNvSpPr>
+            <a:spLocks noGrp="1"/>
+          </p:cNvSpPr>
+          <p:nvPr>
+            <p:ph idx="1"/>
+          </p:nvPr>
+        </p:nvSpPr>
+        <p:spPr/>
+        <p:txBody>
+          <a:bodyPr>
+            <a:normAutofit/>
+          </a:bodyPr>
+          <a:lstStyle/>
+          <a:p>
+            <a:r>
+              <a:rPr lang="en-US" sz="2800" dirty="0" smtClean="0"/>
+              <a:t>Ability to upload pictures via web app. </a:t>
+            </a:r>
+          </a:p>
+          <a:p>
+            <a:r>
+              <a:rPr lang="en-US" sz="2800" dirty="0" smtClean="0"/>
+              <a:t>Ability to purchase items online.</a:t>
+            </a:r>
+          </a:p>
+          <a:p>
+            <a:r>
+              <a:rPr lang="en-US" sz="2800" dirty="0" smtClean="0"/>
+              <a:t>Ability to print QR codes with title and description of item. </a:t>
+            </a:r>
+            <a:endParaRPr lang="en-US" sz="2800" dirty="0"/>
+          </a:p>
+        </p:txBody>
+      </p:sp>
+    </p:spTree>
+    <p:extLst>
+      <p:ext uri="{BB962C8B-B14F-4D97-AF65-F5344CB8AC3E}">
+        <p14:creationId xmlns:p14="http://schemas.microsoft.com/office/powerpoint/2010/main" val="4294329523"/>
+      </p:ext>
+    </p:extLst>
+  </p:cSld>
+  <p:clrMapOvr>
+    <a:masterClrMapping/>
+  </p:clrMapOvr>
+  <mc:AlternateContent xmlns:mc="http://schemas.openxmlformats.org/markup-compatibility/2006" xmlns:p14="http://schemas.microsoft.com/office/powerpoint/2010/main">
+    <mc:Choice Requires="p14">
+      <p:transition spd="med" p14:dur="700">
+        <p:fade/>
+      </p:transition>
+    </mc:Choice>
+    <mc:Fallback xmlns="">
+      <p:transition spd="med">
+        <p:fade/>
+      </p:transition>
+    </mc:Fallback>
+  </mc:AlternateContent>
+  <p:timing>
+    <p:tnLst>
+      <p:par>
+        <p:cTn id="1" dur="indefinite" restart="never" nodeType="tmRoot"/>
+      </p:par>
+    </p:tnLst>
+  </p:timing>
 </p:sld>
 </file>
 
@@ -5013,7 +5609,7 @@
   <a:extraClrSchemeLst/>
   <a:extLst>
     <a:ext uri="{05A4C25C-085E-4340-85A3-A5531E510DB2}">
-      <thm15:themeFamily xmlns:thm15="http://schemas.microsoft.com/office/thememl/2012/main" xmlns="" name="Theme1" id="{F0A370D2-0C8B-45FC-B343-091816E3ACB9}" vid="{67A4EAA7-F10A-45ED-AFA4-9F29F6D5325D}"/>
+      <thm15:themeFamily xmlns:thm15="http://schemas.microsoft.com/office/thememl/2012/main" name="Theme1" id="{F0A370D2-0C8B-45FC-B343-091816E3ACB9}" vid="{67A4EAA7-F10A-45ED-AFA4-9F29F6D5325D}"/>
     </a:ext>
   </a:extLst>
 </a:theme>

</xml_diff>